<commit_message>
se incluyen ejercicios resueltos semana 2
</commit_message>
<xml_diff>
--- a/Sesión_4/Sistemas de segundo orden Discretos.pptx
+++ b/Sesión_4/Sistemas de segundo orden Discretos.pptx
@@ -182,16 +182,32 @@
 </p:presentation>
 </file>
 
-<file path=ppt/revisionInfo.xml><?xml version="1.0" encoding="utf-8"?>
-<p1510:revInfo xmlns:a="http://schemas.openxmlformats.org/drawingml/2006/main" xmlns:r="http://schemas.openxmlformats.org/officeDocument/2006/relationships" xmlns:p1510="http://schemas.microsoft.com/office/powerpoint/2015/10/main">
-  <p1510:revLst>
-    <p1510:client id="{8D5B9C9A-4A92-4012-8653-FF8E3D8ACF65}" v="1" dt="2025-01-13T19:24:20.339"/>
-  </p1510:revLst>
-</p1510:revInfo>
-</file>
-
 <file path=ppt/changesInfos/changesInfo1.xml><?xml version="1.0" encoding="utf-8"?>
 <pc:chgInfo xmlns:a="http://schemas.openxmlformats.org/drawingml/2006/main" xmlns:r="http://schemas.openxmlformats.org/officeDocument/2006/relationships" xmlns:ac="http://schemas.microsoft.com/office/drawing/2013/main/command" xmlns:pc="http://schemas.microsoft.com/office/powerpoint/2013/main/command">
+  <pc:docChgLst>
+    <pc:chgData name="JHEYSON FABIAN VILLAVISAN BUITRAGO" userId="e5ced5c2-d787-455d-b115-4f08a699b8c8" providerId="ADAL" clId="{7935EC72-47C2-4B23-A7D5-31C9BC3C36D7}"/>
+    <pc:docChg chg="modSld">
+      <pc:chgData name="JHEYSON FABIAN VILLAVISAN BUITRAGO" userId="e5ced5c2-d787-455d-b115-4f08a699b8c8" providerId="ADAL" clId="{7935EC72-47C2-4B23-A7D5-31C9BC3C36D7}" dt="2025-02-03T19:26:10.874" v="1" actId="20577"/>
+      <pc:docMkLst>
+        <pc:docMk/>
+      </pc:docMkLst>
+      <pc:sldChg chg="modSp mod">
+        <pc:chgData name="JHEYSON FABIAN VILLAVISAN BUITRAGO" userId="e5ced5c2-d787-455d-b115-4f08a699b8c8" providerId="ADAL" clId="{7935EC72-47C2-4B23-A7D5-31C9BC3C36D7}" dt="2025-02-03T19:26:10.874" v="1" actId="20577"/>
+        <pc:sldMkLst>
+          <pc:docMk/>
+          <pc:sldMk cId="3289317891" sldId="277"/>
+        </pc:sldMkLst>
+        <pc:graphicFrameChg chg="modGraphic">
+          <ac:chgData name="JHEYSON FABIAN VILLAVISAN BUITRAGO" userId="e5ced5c2-d787-455d-b115-4f08a699b8c8" providerId="ADAL" clId="{7935EC72-47C2-4B23-A7D5-31C9BC3C36D7}" dt="2025-02-03T19:26:10.874" v="1" actId="20577"/>
+          <ac:graphicFrameMkLst>
+            <pc:docMk/>
+            <pc:sldMk cId="3289317891" sldId="277"/>
+            <ac:graphicFrameMk id="4" creationId="{F4CD11F0-DFCA-CC07-126D-888DD0F0C560}"/>
+          </ac:graphicFrameMkLst>
+        </pc:graphicFrameChg>
+      </pc:sldChg>
+    </pc:docChg>
+  </pc:docChgLst>
   <pc:docChgLst>
     <pc:chgData name="JHEYSON FABIAN VILLAVISAN BUITRAGO" userId="e5ced5c2-d787-455d-b115-4f08a699b8c8" providerId="ADAL" clId="{A917EF99-4963-45EF-AFB8-A4BED98A7D26}"/>
     <pc:docChg chg="custSel modSld">
@@ -221,14 +237,6 @@
           <pc:docMk/>
           <pc:sldMk cId="2505371292" sldId="270"/>
         </pc:sldMkLst>
-        <pc:graphicFrameChg chg="del">
-          <ac:chgData name="JHEYSON FABIAN VILLAVISAN BUITRAGO" userId="e5ced5c2-d787-455d-b115-4f08a699b8c8" providerId="ADAL" clId="{8D5B9C9A-4A92-4012-8653-FF8E3D8ACF65}" dt="2025-01-13T19:24:19.988" v="0" actId="478"/>
-          <ac:graphicFrameMkLst>
-            <pc:docMk/>
-            <pc:sldMk cId="2505371292" sldId="270"/>
-            <ac:graphicFrameMk id="2" creationId="{F3F82246-C76E-451D-EA87-CDDDEC715557}"/>
-          </ac:graphicFrameMkLst>
-        </pc:graphicFrameChg>
         <pc:graphicFrameChg chg="add mod">
           <ac:chgData name="JHEYSON FABIAN VILLAVISAN BUITRAGO" userId="e5ced5c2-d787-455d-b115-4f08a699b8c8" providerId="ADAL" clId="{8D5B9C9A-4A92-4012-8653-FF8E3D8ACF65}" dt="2025-01-13T19:24:20.339" v="1"/>
           <ac:graphicFrameMkLst>
@@ -381,7 +389,7 @@
               <a:pPr>
                 <a:defRPr/>
               </a:pPr>
-              <a:t>13/01/2025</a:t>
+              <a:t>3/02/2025</a:t>
             </a:fld>
             <a:endParaRPr lang="es-CO"/>
           </a:p>
@@ -624,7 +632,7 @@
               <a:pPr>
                 <a:defRPr/>
               </a:pPr>
-              <a:t>13/01/2025</a:t>
+              <a:t>3/02/2025</a:t>
             </a:fld>
             <a:endParaRPr lang="es-CO"/>
           </a:p>
@@ -9069,7 +9077,7 @@
           <a:p>
             <a:fld id="{9CF7635E-2D71-42E7-9E6C-FBB85A15A85F}" type="datetimeFigureOut">
               <a:rPr lang="es-CO" smtClean="0"/>
-              <a:t>13/01/2025</a:t>
+              <a:t>3/02/2025</a:t>
             </a:fld>
             <a:endParaRPr lang="es-CO"/>
           </a:p>
@@ -9335,7 +9343,7 @@
           <a:p>
             <a:fld id="{9CF7635E-2D71-42E7-9E6C-FBB85A15A85F}" type="datetimeFigureOut">
               <a:rPr lang="es-CO" smtClean="0"/>
-              <a:t>13/01/2025</a:t>
+              <a:t>3/02/2025</a:t>
             </a:fld>
             <a:endParaRPr lang="es-CO"/>
           </a:p>
@@ -9551,7 +9559,7 @@
           <a:p>
             <a:fld id="{9CF7635E-2D71-42E7-9E6C-FBB85A15A85F}" type="datetimeFigureOut">
               <a:rPr lang="es-CO" smtClean="0"/>
-              <a:t>13/01/2025</a:t>
+              <a:t>3/02/2025</a:t>
             </a:fld>
             <a:endParaRPr lang="es-CO"/>
           </a:p>
@@ -11180,7 +11188,7 @@
           <a:p>
             <a:fld id="{9CF7635E-2D71-42E7-9E6C-FBB85A15A85F}" type="datetimeFigureOut">
               <a:rPr lang="es-CO" smtClean="0"/>
-              <a:t>13/01/2025</a:t>
+              <a:t>3/02/2025</a:t>
             </a:fld>
             <a:endParaRPr lang="es-CO"/>
           </a:p>
@@ -11627,7 +11635,7 @@
           <a:p>
             <a:fld id="{9CF7635E-2D71-42E7-9E6C-FBB85A15A85F}" type="datetimeFigureOut">
               <a:rPr lang="es-CO" smtClean="0"/>
-              <a:t>13/01/2025</a:t>
+              <a:t>3/02/2025</a:t>
             </a:fld>
             <a:endParaRPr lang="es-CO"/>
           </a:p>
@@ -11901,7 +11909,7 @@
           <a:p>
             <a:fld id="{9CF7635E-2D71-42E7-9E6C-FBB85A15A85F}" type="datetimeFigureOut">
               <a:rPr lang="es-CO" smtClean="0"/>
-              <a:t>13/01/2025</a:t>
+              <a:t>3/02/2025</a:t>
             </a:fld>
             <a:endParaRPr lang="es-CO"/>
           </a:p>
@@ -12322,7 +12330,7 @@
           <a:p>
             <a:fld id="{9CF7635E-2D71-42E7-9E6C-FBB85A15A85F}" type="datetimeFigureOut">
               <a:rPr lang="es-CO" smtClean="0"/>
-              <a:t>13/01/2025</a:t>
+              <a:t>3/02/2025</a:t>
             </a:fld>
             <a:endParaRPr lang="es-CO"/>
           </a:p>
@@ -12470,7 +12478,7 @@
           <a:p>
             <a:fld id="{9CF7635E-2D71-42E7-9E6C-FBB85A15A85F}" type="datetimeFigureOut">
               <a:rPr lang="es-CO" smtClean="0"/>
-              <a:t>13/01/2025</a:t>
+              <a:t>3/02/2025</a:t>
             </a:fld>
             <a:endParaRPr lang="es-CO"/>
           </a:p>
@@ -12589,7 +12597,7 @@
           <a:p>
             <a:fld id="{9CF7635E-2D71-42E7-9E6C-FBB85A15A85F}" type="datetimeFigureOut">
               <a:rPr lang="es-CO" smtClean="0"/>
-              <a:t>13/01/2025</a:t>
+              <a:t>3/02/2025</a:t>
             </a:fld>
             <a:endParaRPr lang="es-CO"/>
           </a:p>
@@ -12908,7 +12916,7 @@
           <a:p>
             <a:fld id="{9CF7635E-2D71-42E7-9E6C-FBB85A15A85F}" type="datetimeFigureOut">
               <a:rPr lang="es-CO" smtClean="0"/>
-              <a:t>13/01/2025</a:t>
+              <a:t>3/02/2025</a:t>
             </a:fld>
             <a:endParaRPr lang="es-CO"/>
           </a:p>
@@ -13203,7 +13211,7 @@
           <a:p>
             <a:fld id="{9CF7635E-2D71-42E7-9E6C-FBB85A15A85F}" type="datetimeFigureOut">
               <a:rPr lang="es-CO" smtClean="0"/>
-              <a:t>13/01/2025</a:t>
+              <a:t>3/02/2025</a:t>
             </a:fld>
             <a:endParaRPr lang="es-CO"/>
           </a:p>
@@ -13452,7 +13460,7 @@
           <a:p>
             <a:fld id="{9CF7635E-2D71-42E7-9E6C-FBB85A15A85F}" type="datetimeFigureOut">
               <a:rPr lang="es-CO" smtClean="0"/>
-              <a:t>13/01/2025</a:t>
+              <a:t>3/02/2025</a:t>
             </a:fld>
             <a:endParaRPr lang="es-CO"/>
           </a:p>
@@ -28595,8 +28603,8 @@
           </p:sp>
         </mc:Fallback>
       </mc:AlternateContent>
-      <mc:AlternateContent xmlns:mc="http://schemas.openxmlformats.org/markup-compatibility/2006" xmlns:a14="http://schemas.microsoft.com/office/drawing/2010/main">
-        <mc:Choice Requires="a14">
+      <mc:AlternateContent xmlns:mc="http://schemas.openxmlformats.org/markup-compatibility/2006">
+        <mc:Choice xmlns:a14="http://schemas.microsoft.com/office/drawing/2010/main" Requires="a14">
           <p:graphicFrame>
             <p:nvGraphicFramePr>
               <p:cNvPr id="4" name="Tabla 3">
@@ -28612,7 +28620,7 @@
               <p:nvPr>
                 <p:extLst>
                   <p:ext uri="{D42A27DB-BD31-4B8C-83A1-F6EECF244321}">
-                    <p14:modId xmlns:p14="http://schemas.microsoft.com/office/powerpoint/2010/main" val="2247337375"/>
+                    <p14:modId xmlns:p14="http://schemas.microsoft.com/office/powerpoint/2010/main" val="2348765505"/>
                   </p:ext>
                 </p:extLst>
               </p:nvPr>
@@ -28720,9 +28728,10 @@
                         <a:lstStyle/>
                         <a:p>
                           <a:r>
-                            <a:rPr lang="en-US" dirty="0"/>
-                            <a:t>0,1</a:t>
+                            <a:rPr lang="en-US"/>
+                            <a:t>0,2</a:t>
                           </a:r>
+                          <a:endParaRPr lang="en-US" dirty="0"/>
                         </a:p>
                       </a:txBody>
                       <a:tcPr/>
@@ -28798,7 +28807,7 @@
             </a:graphic>
           </p:graphicFrame>
         </mc:Choice>
-        <mc:Fallback xmlns="">
+        <mc:Fallback>
           <p:graphicFrame>
             <p:nvGraphicFramePr>
               <p:cNvPr id="4" name="Tabla 3">
@@ -28814,7 +28823,7 @@
               <p:nvPr>
                 <p:extLst>
                   <p:ext uri="{D42A27DB-BD31-4B8C-83A1-F6EECF244321}">
-                    <p14:modId xmlns:p14="http://schemas.microsoft.com/office/powerpoint/2010/main" val="2247337375"/>
+                    <p14:modId xmlns:p14="http://schemas.microsoft.com/office/powerpoint/2010/main" val="2348765505"/>
                   </p:ext>
                 </p:extLst>
               </p:nvPr>
@@ -28909,9 +28918,10 @@
                         <a:lstStyle/>
                         <a:p>
                           <a:r>
-                            <a:rPr lang="en-US" dirty="0"/>
-                            <a:t>0,1</a:t>
+                            <a:rPr lang="en-US"/>
+                            <a:t>0,2</a:t>
                           </a:r>
+                          <a:endParaRPr lang="en-US" dirty="0"/>
                         </a:p>
                       </a:txBody>
                       <a:tcPr/>
@@ -33316,6 +33326,14 @@
 </file>
 
 <file path=customXml/item2.xml><?xml version="1.0" encoding="utf-8"?>
+<p:properties xmlns:p="http://schemas.microsoft.com/office/2006/metadata/properties" xmlns:xsi="http://www.w3.org/2001/XMLSchema-instance" xmlns:pc="http://schemas.microsoft.com/office/infopath/2007/PartnerControls">
+  <documentManagement>
+    <_activity xmlns="bdc56f61-abc0-4f7e-bfec-a93ccd1ae886" xsi:nil="true"/>
+  </documentManagement>
+</p:properties>
+</file>
+
+<file path=customXml/item3.xml><?xml version="1.0" encoding="utf-8"?>
 <ct:contentTypeSchema xmlns:ct="http://schemas.microsoft.com/office/2006/metadata/contentType" xmlns:ma="http://schemas.microsoft.com/office/2006/metadata/properties/metaAttributes" ct:_="" ma:_="" ma:contentTypeName="Documento" ma:contentTypeID="0x0101007A62137D465CE64A8C883A4664514BF8" ma:contentTypeVersion="15" ma:contentTypeDescription="Crear nuevo documento." ma:contentTypeScope="" ma:versionID="a1bd1d59f691eb9bca6952b111268275">
   <xsd:schema xmlns:xsd="http://www.w3.org/2001/XMLSchema" xmlns:xs="http://www.w3.org/2001/XMLSchema" xmlns:p="http://schemas.microsoft.com/office/2006/metadata/properties" xmlns:ns3="669280c1-d17e-4d1d-bd7f-b4f14cc6bf1d" xmlns:ns4="bdc56f61-abc0-4f7e-bfec-a93ccd1ae886" targetNamespace="http://schemas.microsoft.com/office/2006/metadata/properties" ma:root="true" ma:fieldsID="d02990a02f19f0f9fc7b999b1809cae4" ns3:_="" ns4:_="">
     <xsd:import namespace="669280c1-d17e-4d1d-bd7f-b4f14cc6bf1d"/>
@@ -33550,14 +33568,6 @@
 </ct:contentTypeSchema>
 </file>
 
-<file path=customXml/item3.xml><?xml version="1.0" encoding="utf-8"?>
-<p:properties xmlns:p="http://schemas.microsoft.com/office/2006/metadata/properties" xmlns:xsi="http://www.w3.org/2001/XMLSchema-instance" xmlns:pc="http://schemas.microsoft.com/office/infopath/2007/PartnerControls">
-  <documentManagement>
-    <_activity xmlns="bdc56f61-abc0-4f7e-bfec-a93ccd1ae886" xsi:nil="true"/>
-  </documentManagement>
-</p:properties>
-</file>
-
 <file path=customXml/itemProps1.xml><?xml version="1.0" encoding="utf-8"?>
 <ds:datastoreItem xmlns:ds="http://schemas.openxmlformats.org/officeDocument/2006/customXml" ds:itemID="{4E8623C8-32E1-48B0-9F0A-13F2E9582B7E}">
   <ds:schemaRefs>
@@ -33567,6 +33577,23 @@
 </file>
 
 <file path=customXml/itemProps2.xml><?xml version="1.0" encoding="utf-8"?>
+<ds:datastoreItem xmlns:ds="http://schemas.openxmlformats.org/officeDocument/2006/customXml" ds:itemID="{0825853C-1B27-4995-A583-4D39F900BB7F}">
+  <ds:schemaRefs>
+    <ds:schemaRef ds:uri="669280c1-d17e-4d1d-bd7f-b4f14cc6bf1d"/>
+    <ds:schemaRef ds:uri="bdc56f61-abc0-4f7e-bfec-a93ccd1ae886"/>
+    <ds:schemaRef ds:uri="http://purl.org/dc/dcmitype/"/>
+    <ds:schemaRef ds:uri="http://purl.org/dc/elements/1.1/"/>
+    <ds:schemaRef ds:uri="http://purl.org/dc/terms/"/>
+    <ds:schemaRef ds:uri="http://schemas.microsoft.com/office/2006/documentManagement/types"/>
+    <ds:schemaRef ds:uri="http://schemas.microsoft.com/office/2006/metadata/properties"/>
+    <ds:schemaRef ds:uri="http://schemas.microsoft.com/office/infopath/2007/PartnerControls"/>
+    <ds:schemaRef ds:uri="http://schemas.openxmlformats.org/package/2006/metadata/core-properties"/>
+    <ds:schemaRef ds:uri="http://www.w3.org/XML/1998/namespace"/>
+  </ds:schemaRefs>
+</ds:datastoreItem>
+</file>
+
+<file path=customXml/itemProps3.xml><?xml version="1.0" encoding="utf-8"?>
 <ds:datastoreItem xmlns:ds="http://schemas.openxmlformats.org/officeDocument/2006/customXml" ds:itemID="{025820C3-FD82-4EFC-BF14-EAF1F9613F52}">
   <ds:schemaRefs>
     <ds:schemaRef ds:uri="669280c1-d17e-4d1d-bd7f-b4f14cc6bf1d"/>
@@ -33583,21 +33610,4 @@
     <ds:schemaRef ds:uri="http://www.w3.org/2001/XMLSchema"/>
   </ds:schemaRefs>
 </ds:datastoreItem>
-</file>
-
-<file path=customXml/itemProps3.xml><?xml version="1.0" encoding="utf-8"?>
-<ds:datastoreItem xmlns:ds="http://schemas.openxmlformats.org/officeDocument/2006/customXml" ds:itemID="{0825853C-1B27-4995-A583-4D39F900BB7F}">
-  <ds:schemaRefs>
-    <ds:schemaRef ds:uri="669280c1-d17e-4d1d-bd7f-b4f14cc6bf1d"/>
-    <ds:schemaRef ds:uri="bdc56f61-abc0-4f7e-bfec-a93ccd1ae886"/>
-    <ds:schemaRef ds:uri="http://purl.org/dc/dcmitype/"/>
-    <ds:schemaRef ds:uri="http://purl.org/dc/elements/1.1/"/>
-    <ds:schemaRef ds:uri="http://purl.org/dc/terms/"/>
-    <ds:schemaRef ds:uri="http://schemas.microsoft.com/office/2006/documentManagement/types"/>
-    <ds:schemaRef ds:uri="http://schemas.microsoft.com/office/2006/metadata/properties"/>
-    <ds:schemaRef ds:uri="http://schemas.microsoft.com/office/infopath/2007/PartnerControls"/>
-    <ds:schemaRef ds:uri="http://schemas.openxmlformats.org/package/2006/metadata/core-properties"/>
-    <ds:schemaRef ds:uri="http://www.w3.org/XML/1998/namespace"/>
-  </ds:schemaRefs>
-</ds:datastoreItem>
 </file>
</xml_diff>